<commit_message>
My final Login window
</commit_message>
<xml_diff>
--- a/PresentationGardenPlanner.pptx
+++ b/PresentationGardenPlanner.pptx
@@ -15,10 +15,8 @@
     <p:sldId id="263" r:id="rId9"/>
     <p:sldId id="264" r:id="rId10"/>
     <p:sldId id="265" r:id="rId11"/>
-    <p:sldId id="266" r:id="rId12"/>
-    <p:sldId id="267" r:id="rId13"/>
-    <p:sldId id="268" r:id="rId14"/>
-    <p:sldId id="269" r:id="rId15"/>
+    <p:sldId id="267" r:id="rId12"/>
+    <p:sldId id="269" r:id="rId13"/>
   </p:sldIdLst>
   <p:sldSz cx="12192000" cy="6858000"/>
   <p:notesSz cx="6858000" cy="9144000"/>
@@ -185,29 +183,6 @@
 
 <file path=ppt/comments/comment11.xml><?xml version="1.0" encoding="utf-8"?>
 <p:cmLst xmlns:a="http://schemas.openxmlformats.org/drawingml/2006/main" xmlns:r="http://schemas.openxmlformats.org/officeDocument/2006/relationships" xmlns:p="http://schemas.openxmlformats.org/presentationml/2006/main">
-  <p:cm authorId="1" dt="2016-09-15T13:02:47.469" idx="22">
-    <p:pos x="10" y="10"/>
-    <p:text>Nathalie</p:text>
-    <p:extLst>
-      <p:ext uri="{C676402C-5697-4E1C-873F-D02D1690AC5C}">
-        <p15:threadingInfo xmlns:p15="http://schemas.microsoft.com/office/powerpoint/2012/main" timeZoneBias="240"/>
-      </p:ext>
-    </p:extLst>
-  </p:cm>
-  <p:cm authorId="1" dt="2016-09-15T13:02:56.109" idx="23">
-    <p:pos x="106" y="106"/>
-    <p:text>What we learned</p:text>
-    <p:extLst>
-      <p:ext uri="{C676402C-5697-4E1C-873F-D02D1690AC5C}">
-        <p15:threadingInfo xmlns:p15="http://schemas.microsoft.com/office/powerpoint/2012/main" timeZoneBias="240"/>
-      </p:ext>
-    </p:extLst>
-  </p:cm>
-</p:cmLst>
-</file>
-
-<file path=ppt/comments/comment12.xml><?xml version="1.0" encoding="utf-8"?>
-<p:cmLst xmlns:a="http://schemas.openxmlformats.org/drawingml/2006/main" xmlns:r="http://schemas.openxmlformats.org/officeDocument/2006/relationships" xmlns:p="http://schemas.openxmlformats.org/presentationml/2006/main">
   <p:cm authorId="1" dt="2016-09-15T13:03:18.496" idx="24">
     <p:pos x="10" y="10"/>
     <p:text>Nikolay</p:text>
@@ -229,30 +204,7 @@
 </p:cmLst>
 </file>
 
-<file path=ppt/comments/comment13.xml><?xml version="1.0" encoding="utf-8"?>
-<p:cmLst xmlns:a="http://schemas.openxmlformats.org/drawingml/2006/main" xmlns:r="http://schemas.openxmlformats.org/officeDocument/2006/relationships" xmlns:p="http://schemas.openxmlformats.org/presentationml/2006/main">
-  <p:cm authorId="1" dt="2016-09-15T13:05:12.993" idx="28">
-    <p:pos x="10" y="10"/>
-    <p:text>Nathalie</p:text>
-    <p:extLst>
-      <p:ext uri="{C676402C-5697-4E1C-873F-D02D1690AC5C}">
-        <p15:threadingInfo xmlns:p15="http://schemas.microsoft.com/office/powerpoint/2012/main" timeZoneBias="240"/>
-      </p:ext>
-    </p:extLst>
-  </p:cm>
-  <p:cm authorId="1" dt="2016-09-15T13:05:28.387" idx="29">
-    <p:pos x="106" y="106"/>
-    <p:text>Future work</p:text>
-    <p:extLst>
-      <p:ext uri="{C676402C-5697-4E1C-873F-D02D1690AC5C}">
-        <p15:threadingInfo xmlns:p15="http://schemas.microsoft.com/office/powerpoint/2012/main" timeZoneBias="240"/>
-      </p:ext>
-    </p:extLst>
-  </p:cm>
-</p:cmLst>
-</file>
-
-<file path=ppt/comments/comment14.xml><?xml version="1.0" encoding="utf-8"?>
+<file path=ppt/comments/comment12.xml><?xml version="1.0" encoding="utf-8"?>
 <p:cmLst xmlns:a="http://schemas.openxmlformats.org/drawingml/2006/main" xmlns:r="http://schemas.openxmlformats.org/officeDocument/2006/relationships" xmlns:p="http://schemas.openxmlformats.org/presentationml/2006/main">
   <p:cm authorId="1" dt="2016-09-15T13:06:28.196" idx="30">
     <p:pos x="10" y="10"/>
@@ -590,7 +542,7 @@
           <a:p>
             <a:fld id="{CD87B476-F4B1-44DC-9882-9C39F5F8357C}" type="datetimeFigureOut">
               <a:rPr lang="fr-CA" smtClean="0"/>
-              <a:t>2016-09-15</a:t>
+              <a:t>16/sept.2016</a:t>
             </a:fld>
             <a:endParaRPr lang="fr-CA"/>
           </a:p>
@@ -760,7 +712,7 @@
           <a:p>
             <a:fld id="{CD87B476-F4B1-44DC-9882-9C39F5F8357C}" type="datetimeFigureOut">
               <a:rPr lang="fr-CA" smtClean="0"/>
-              <a:t>2016-09-15</a:t>
+              <a:t>16/sept.2016</a:t>
             </a:fld>
             <a:endParaRPr lang="fr-CA"/>
           </a:p>
@@ -940,7 +892,7 @@
           <a:p>
             <a:fld id="{CD87B476-F4B1-44DC-9882-9C39F5F8357C}" type="datetimeFigureOut">
               <a:rPr lang="fr-CA" smtClean="0"/>
-              <a:t>2016-09-15</a:t>
+              <a:t>16/sept.2016</a:t>
             </a:fld>
             <a:endParaRPr lang="fr-CA"/>
           </a:p>
@@ -1110,7 +1062,7 @@
           <a:p>
             <a:fld id="{CD87B476-F4B1-44DC-9882-9C39F5F8357C}" type="datetimeFigureOut">
               <a:rPr lang="fr-CA" smtClean="0"/>
-              <a:t>2016-09-15</a:t>
+              <a:t>16/sept.2016</a:t>
             </a:fld>
             <a:endParaRPr lang="fr-CA"/>
           </a:p>
@@ -1356,7 +1308,7 @@
           <a:p>
             <a:fld id="{CD87B476-F4B1-44DC-9882-9C39F5F8357C}" type="datetimeFigureOut">
               <a:rPr lang="fr-CA" smtClean="0"/>
-              <a:t>2016-09-15</a:t>
+              <a:t>16/sept.2016</a:t>
             </a:fld>
             <a:endParaRPr lang="fr-CA"/>
           </a:p>
@@ -1588,7 +1540,7 @@
           <a:p>
             <a:fld id="{CD87B476-F4B1-44DC-9882-9C39F5F8357C}" type="datetimeFigureOut">
               <a:rPr lang="fr-CA" smtClean="0"/>
-              <a:t>2016-09-15</a:t>
+              <a:t>16/sept.2016</a:t>
             </a:fld>
             <a:endParaRPr lang="fr-CA"/>
           </a:p>
@@ -1955,7 +1907,7 @@
           <a:p>
             <a:fld id="{CD87B476-F4B1-44DC-9882-9C39F5F8357C}" type="datetimeFigureOut">
               <a:rPr lang="fr-CA" smtClean="0"/>
-              <a:t>2016-09-15</a:t>
+              <a:t>16/sept.2016</a:t>
             </a:fld>
             <a:endParaRPr lang="fr-CA"/>
           </a:p>
@@ -2073,7 +2025,7 @@
           <a:p>
             <a:fld id="{CD87B476-F4B1-44DC-9882-9C39F5F8357C}" type="datetimeFigureOut">
               <a:rPr lang="fr-CA" smtClean="0"/>
-              <a:t>2016-09-15</a:t>
+              <a:t>16/sept.2016</a:t>
             </a:fld>
             <a:endParaRPr lang="fr-CA"/>
           </a:p>
@@ -2168,7 +2120,7 @@
           <a:p>
             <a:fld id="{CD87B476-F4B1-44DC-9882-9C39F5F8357C}" type="datetimeFigureOut">
               <a:rPr lang="fr-CA" smtClean="0"/>
-              <a:t>2016-09-15</a:t>
+              <a:t>16/sept.2016</a:t>
             </a:fld>
             <a:endParaRPr lang="fr-CA"/>
           </a:p>
@@ -2445,7 +2397,7 @@
           <a:p>
             <a:fld id="{CD87B476-F4B1-44DC-9882-9C39F5F8357C}" type="datetimeFigureOut">
               <a:rPr lang="fr-CA" smtClean="0"/>
-              <a:t>2016-09-15</a:t>
+              <a:t>16/sept.2016</a:t>
             </a:fld>
             <a:endParaRPr lang="fr-CA"/>
           </a:p>
@@ -2698,7 +2650,7 @@
           <a:p>
             <a:fld id="{CD87B476-F4B1-44DC-9882-9C39F5F8357C}" type="datetimeFigureOut">
               <a:rPr lang="fr-CA" smtClean="0"/>
-              <a:t>2016-09-15</a:t>
+              <a:t>16/sept.2016</a:t>
             </a:fld>
             <a:endParaRPr lang="fr-CA"/>
           </a:p>
@@ -2911,7 +2863,7 @@
           <a:p>
             <a:fld id="{CD87B476-F4B1-44DC-9882-9C39F5F8357C}" type="datetimeFigureOut">
               <a:rPr lang="fr-CA" smtClean="0"/>
-              <a:t>2016-09-15</a:t>
+              <a:t>16/sept.2016</a:t>
             </a:fld>
             <a:endParaRPr lang="fr-CA"/>
           </a:p>
@@ -3655,36 +3607,6 @@
           <a:chExt cx="0" cy="0"/>
         </a:xfrm>
       </p:grpSpPr>
-    </p:spTree>
-    <p:extLst>
-      <p:ext uri="{BB962C8B-B14F-4D97-AF65-F5344CB8AC3E}">
-        <p14:creationId xmlns:p14="http://schemas.microsoft.com/office/powerpoint/2010/main" val="4054131905"/>
-      </p:ext>
-    </p:extLst>
-  </p:cSld>
-  <p:clrMapOvr>
-    <a:masterClrMapping/>
-  </p:clrMapOvr>
-</p:sld>
-</file>
-
-<file path=ppt/slides/slide12.xml><?xml version="1.0" encoding="utf-8"?>
-<p:sld xmlns:a="http://schemas.openxmlformats.org/drawingml/2006/main" xmlns:r="http://schemas.openxmlformats.org/officeDocument/2006/relationships" xmlns:p="http://schemas.openxmlformats.org/presentationml/2006/main">
-  <p:cSld>
-    <p:spTree>
-      <p:nvGrpSpPr>
-        <p:cNvPr id="1" name=""/>
-        <p:cNvGrpSpPr/>
-        <p:nvPr/>
-      </p:nvGrpSpPr>
-      <p:grpSpPr>
-        <a:xfrm>
-          <a:off x="0" y="0"/>
-          <a:ext cx="0" cy="0"/>
-          <a:chOff x="0" y="0"/>
-          <a:chExt cx="0" cy="0"/>
-        </a:xfrm>
-      </p:grpSpPr>
       <p:sp>
         <p:nvSpPr>
           <p:cNvPr id="2" name="TextBox 1"/>
@@ -3857,37 +3779,7 @@
 </p:sld>
 </file>
 
-<file path=ppt/slides/slide13.xml><?xml version="1.0" encoding="utf-8"?>
-<p:sld xmlns:a="http://schemas.openxmlformats.org/drawingml/2006/main" xmlns:r="http://schemas.openxmlformats.org/officeDocument/2006/relationships" xmlns:p="http://schemas.openxmlformats.org/presentationml/2006/main">
-  <p:cSld>
-    <p:spTree>
-      <p:nvGrpSpPr>
-        <p:cNvPr id="1" name=""/>
-        <p:cNvGrpSpPr/>
-        <p:nvPr/>
-      </p:nvGrpSpPr>
-      <p:grpSpPr>
-        <a:xfrm>
-          <a:off x="0" y="0"/>
-          <a:ext cx="0" cy="0"/>
-          <a:chOff x="0" y="0"/>
-          <a:chExt cx="0" cy="0"/>
-        </a:xfrm>
-      </p:grpSpPr>
-    </p:spTree>
-    <p:extLst>
-      <p:ext uri="{BB962C8B-B14F-4D97-AF65-F5344CB8AC3E}">
-        <p14:creationId xmlns:p14="http://schemas.microsoft.com/office/powerpoint/2010/main" val="4137718801"/>
-      </p:ext>
-    </p:extLst>
-  </p:cSld>
-  <p:clrMapOvr>
-    <a:masterClrMapping/>
-  </p:clrMapOvr>
-</p:sld>
-</file>
-
-<file path=ppt/slides/slide14.xml><?xml version="1.0" encoding="utf-8"?>
+<file path=ppt/slides/slide12.xml><?xml version="1.0" encoding="utf-8"?>
 <p:sld xmlns:a="http://schemas.openxmlformats.org/drawingml/2006/main" xmlns:r="http://schemas.openxmlformats.org/officeDocument/2006/relationships" xmlns:p="http://schemas.openxmlformats.org/presentationml/2006/main">
   <p:cSld>
     <p:spTree>

</xml_diff>